<commit_message>
Add context support domain
</commit_message>
<xml_diff>
--- a/docs/framework_zh.pptx
+++ b/docs/framework_zh.pptx
@@ -106,6 +106,11 @@
       </a:defRPr>
     </a:lvl9pPr>
   </p:defaultTextStyle>
+  <p:extLst>
+    <p:ext uri="{EFAFB233-063F-42B5-8137-9DF3F51BA10A}">
+      <p15:sldGuideLst xmlns:p15="http://schemas.microsoft.com/office/powerpoint/2012/main"/>
+    </p:ext>
+  </p:extLst>
 </p:presentation>
 </file>
 
@@ -256,7 +261,7 @@
           <a:p>
             <a:fld id="{E14CFB17-61C5-F142-9106-E9864082FFE5}" type="datetimeFigureOut">
               <a:rPr kumimoji="1" lang="zh-CN" altLang="en-US" smtClean="0"/>
-              <a:t>2019/4/30</a:t>
+              <a:t>2019/5/3</a:t>
             </a:fld>
             <a:endParaRPr kumimoji="1" lang="zh-CN" altLang="en-US"/>
           </a:p>
@@ -454,7 +459,7 @@
           <a:p>
             <a:fld id="{E14CFB17-61C5-F142-9106-E9864082FFE5}" type="datetimeFigureOut">
               <a:rPr kumimoji="1" lang="zh-CN" altLang="en-US" smtClean="0"/>
-              <a:t>2019/4/30</a:t>
+              <a:t>2019/5/3</a:t>
             </a:fld>
             <a:endParaRPr kumimoji="1" lang="zh-CN" altLang="en-US"/>
           </a:p>
@@ -662,7 +667,7 @@
           <a:p>
             <a:fld id="{E14CFB17-61C5-F142-9106-E9864082FFE5}" type="datetimeFigureOut">
               <a:rPr kumimoji="1" lang="zh-CN" altLang="en-US" smtClean="0"/>
-              <a:t>2019/4/30</a:t>
+              <a:t>2019/5/3</a:t>
             </a:fld>
             <a:endParaRPr kumimoji="1" lang="zh-CN" altLang="en-US"/>
           </a:p>
@@ -860,7 +865,7 @@
           <a:p>
             <a:fld id="{E14CFB17-61C5-F142-9106-E9864082FFE5}" type="datetimeFigureOut">
               <a:rPr kumimoji="1" lang="zh-CN" altLang="en-US" smtClean="0"/>
-              <a:t>2019/4/30</a:t>
+              <a:t>2019/5/3</a:t>
             </a:fld>
             <a:endParaRPr kumimoji="1" lang="zh-CN" altLang="en-US"/>
           </a:p>
@@ -1135,7 +1140,7 @@
           <a:p>
             <a:fld id="{E14CFB17-61C5-F142-9106-E9864082FFE5}" type="datetimeFigureOut">
               <a:rPr kumimoji="1" lang="zh-CN" altLang="en-US" smtClean="0"/>
-              <a:t>2019/4/30</a:t>
+              <a:t>2019/5/3</a:t>
             </a:fld>
             <a:endParaRPr kumimoji="1" lang="zh-CN" altLang="en-US"/>
           </a:p>
@@ -1400,7 +1405,7 @@
           <a:p>
             <a:fld id="{E14CFB17-61C5-F142-9106-E9864082FFE5}" type="datetimeFigureOut">
               <a:rPr kumimoji="1" lang="zh-CN" altLang="en-US" smtClean="0"/>
-              <a:t>2019/4/30</a:t>
+              <a:t>2019/5/3</a:t>
             </a:fld>
             <a:endParaRPr kumimoji="1" lang="zh-CN" altLang="en-US"/>
           </a:p>
@@ -1812,7 +1817,7 @@
           <a:p>
             <a:fld id="{E14CFB17-61C5-F142-9106-E9864082FFE5}" type="datetimeFigureOut">
               <a:rPr kumimoji="1" lang="zh-CN" altLang="en-US" smtClean="0"/>
-              <a:t>2019/4/30</a:t>
+              <a:t>2019/5/3</a:t>
             </a:fld>
             <a:endParaRPr kumimoji="1" lang="zh-CN" altLang="en-US"/>
           </a:p>
@@ -1953,7 +1958,7 @@
           <a:p>
             <a:fld id="{E14CFB17-61C5-F142-9106-E9864082FFE5}" type="datetimeFigureOut">
               <a:rPr kumimoji="1" lang="zh-CN" altLang="en-US" smtClean="0"/>
-              <a:t>2019/4/30</a:t>
+              <a:t>2019/5/3</a:t>
             </a:fld>
             <a:endParaRPr kumimoji="1" lang="zh-CN" altLang="en-US"/>
           </a:p>
@@ -2066,7 +2071,7 @@
           <a:p>
             <a:fld id="{E14CFB17-61C5-F142-9106-E9864082FFE5}" type="datetimeFigureOut">
               <a:rPr kumimoji="1" lang="zh-CN" altLang="en-US" smtClean="0"/>
-              <a:t>2019/4/30</a:t>
+              <a:t>2019/5/3</a:t>
             </a:fld>
             <a:endParaRPr kumimoji="1" lang="zh-CN" altLang="en-US"/>
           </a:p>
@@ -2377,7 +2382,7 @@
           <a:p>
             <a:fld id="{E14CFB17-61C5-F142-9106-E9864082FFE5}" type="datetimeFigureOut">
               <a:rPr kumimoji="1" lang="zh-CN" altLang="en-US" smtClean="0"/>
-              <a:t>2019/4/30</a:t>
+              <a:t>2019/5/3</a:t>
             </a:fld>
             <a:endParaRPr kumimoji="1" lang="zh-CN" altLang="en-US"/>
           </a:p>
@@ -2665,7 +2670,7 @@
           <a:p>
             <a:fld id="{E14CFB17-61C5-F142-9106-E9864082FFE5}" type="datetimeFigureOut">
               <a:rPr kumimoji="1" lang="zh-CN" altLang="en-US" smtClean="0"/>
-              <a:t>2019/4/30</a:t>
+              <a:t>2019/5/3</a:t>
             </a:fld>
             <a:endParaRPr kumimoji="1" lang="zh-CN" altLang="en-US"/>
           </a:p>
@@ -2906,7 +2911,7 @@
           <a:p>
             <a:fld id="{E14CFB17-61C5-F142-9106-E9864082FFE5}" type="datetimeFigureOut">
               <a:rPr kumimoji="1" lang="zh-CN" altLang="en-US" smtClean="0"/>
-              <a:t>2019/4/30</a:t>
+              <a:t>2019/5/3</a:t>
             </a:fld>
             <a:endParaRPr kumimoji="1" lang="zh-CN" altLang="en-US"/>
           </a:p>
@@ -3367,48 +3372,6 @@
           </a:p>
         </p:txBody>
       </p:sp>
-      <p:cxnSp>
-        <p:nvCxnSpPr>
-          <p:cNvPr id="6" name="直线连接符 5">
-            <a:extLst>
-              <a:ext uri="{FF2B5EF4-FFF2-40B4-BE49-F238E27FC236}">
-                <a16:creationId xmlns:a16="http://schemas.microsoft.com/office/drawing/2014/main" id="{EF978270-2E37-A247-BE72-EA32714C723E}"/>
-              </a:ext>
-            </a:extLst>
-          </p:cNvPr>
-          <p:cNvCxnSpPr>
-            <a:stCxn id="4" idx="7"/>
-            <a:endCxn id="4" idx="3"/>
-          </p:cNvCxnSpPr>
-          <p:nvPr/>
-        </p:nvCxnSpPr>
-        <p:spPr>
-          <a:xfrm flipH="1">
-            <a:off x="4208863" y="2070122"/>
-            <a:ext cx="4184180" cy="2801840"/>
-          </a:xfrm>
-          <a:prstGeom prst="line">
-            <a:avLst/>
-          </a:prstGeom>
-          <a:ln>
-            <a:prstDash val="dash"/>
-          </a:ln>
-        </p:spPr>
-        <p:style>
-          <a:lnRef idx="1">
-            <a:schemeClr val="accent1"/>
-          </a:lnRef>
-          <a:fillRef idx="0">
-            <a:schemeClr val="accent1"/>
-          </a:fillRef>
-          <a:effectRef idx="0">
-            <a:schemeClr val="accent1"/>
-          </a:effectRef>
-          <a:fontRef idx="minor">
-            <a:schemeClr val="tx1"/>
-          </a:fontRef>
-        </p:style>
-      </p:cxnSp>
       <p:sp>
         <p:nvSpPr>
           <p:cNvPr id="7" name="文本框 6">
@@ -3423,7 +3386,7 @@
         </p:nvSpPr>
         <p:spPr>
           <a:xfrm>
-            <a:off x="5423338" y="1595316"/>
+            <a:off x="4023260" y="2082546"/>
             <a:ext cx="1107996" cy="369332"/>
           </a:xfrm>
           <a:prstGeom prst="rect">
@@ -3459,7 +3422,7 @@
         </p:nvSpPr>
         <p:spPr>
           <a:xfrm>
-            <a:off x="7839045" y="2588544"/>
+            <a:off x="8082441" y="2793358"/>
             <a:ext cx="1107996" cy="369332"/>
           </a:xfrm>
           <a:prstGeom prst="rect">
@@ -3495,8 +3458,8 @@
         </p:nvSpPr>
         <p:spPr>
           <a:xfrm>
-            <a:off x="3731172" y="2169600"/>
-            <a:ext cx="2659117" cy="1576552"/>
+            <a:off x="3569597" y="3044581"/>
+            <a:ext cx="2015322" cy="1083210"/>
           </a:xfrm>
           <a:prstGeom prst="ellipse">
             <a:avLst/>
@@ -3544,8 +3507,8 @@
         </p:nvSpPr>
         <p:spPr>
           <a:xfrm>
-            <a:off x="5785109" y="3585550"/>
-            <a:ext cx="2659117" cy="1576552"/>
+            <a:off x="6262767" y="3671838"/>
+            <a:ext cx="2099998" cy="1328029"/>
           </a:xfrm>
           <a:prstGeom prst="ellipse">
             <a:avLst/>
@@ -3646,6 +3609,203 @@
               <a:rPr kumimoji="1" lang="zh-CN" altLang="en-US" dirty="0"/>
               <a:t>领域</a:t>
             </a:r>
+          </a:p>
+        </p:txBody>
+      </p:sp>
+      <p:sp>
+        <p:nvSpPr>
+          <p:cNvPr id="2" name="弧 1">
+            <a:extLst>
+              <a:ext uri="{FF2B5EF4-FFF2-40B4-BE49-F238E27FC236}">
+                <a16:creationId xmlns:a16="http://schemas.microsoft.com/office/drawing/2014/main" id="{860EFAC7-B6F3-B048-8202-634E103CEDF6}"/>
+              </a:ext>
+            </a:extLst>
+          </p:cNvPr>
+          <p:cNvSpPr/>
+          <p:nvPr/>
+        </p:nvSpPr>
+        <p:spPr>
+          <a:xfrm rot="19873039">
+            <a:off x="5123942" y="2872794"/>
+            <a:ext cx="4962697" cy="3042727"/>
+          </a:xfrm>
+          <a:prstGeom prst="arc">
+            <a:avLst>
+              <a:gd name="adj1" fmla="val 11171812"/>
+              <a:gd name="adj2" fmla="val 20273594"/>
+            </a:avLst>
+          </a:prstGeom>
+          <a:ln w="19050">
+            <a:prstDash val="dash"/>
+          </a:ln>
+        </p:spPr>
+        <p:style>
+          <a:lnRef idx="1">
+            <a:schemeClr val="accent1"/>
+          </a:lnRef>
+          <a:fillRef idx="0">
+            <a:schemeClr val="accent1"/>
+          </a:fillRef>
+          <a:effectRef idx="0">
+            <a:schemeClr val="accent1"/>
+          </a:effectRef>
+          <a:fontRef idx="minor">
+            <a:schemeClr val="tx1"/>
+          </a:fontRef>
+        </p:style>
+        <p:txBody>
+          <a:bodyPr rtlCol="0" anchor="ctr"/>
+          <a:lstStyle/>
+          <a:p>
+            <a:pPr algn="ctr"/>
+            <a:endParaRPr kumimoji="1" lang="zh-CN" altLang="en-US"/>
+          </a:p>
+        </p:txBody>
+      </p:sp>
+      <p:sp>
+        <p:nvSpPr>
+          <p:cNvPr id="12" name="弧 11">
+            <a:extLst>
+              <a:ext uri="{FF2B5EF4-FFF2-40B4-BE49-F238E27FC236}">
+                <a16:creationId xmlns:a16="http://schemas.microsoft.com/office/drawing/2014/main" id="{9C28A33E-EA1F-9B48-BFCA-837F28092254}"/>
+              </a:ext>
+            </a:extLst>
+          </p:cNvPr>
+          <p:cNvSpPr/>
+          <p:nvPr/>
+        </p:nvSpPr>
+        <p:spPr>
+          <a:xfrm rot="13475816" flipV="1">
+            <a:off x="3425169" y="2042803"/>
+            <a:ext cx="2980583" cy="2428989"/>
+          </a:xfrm>
+          <a:prstGeom prst="arc">
+            <a:avLst>
+              <a:gd name="adj1" fmla="val 13097593"/>
+              <a:gd name="adj2" fmla="val 20101184"/>
+            </a:avLst>
+          </a:prstGeom>
+          <a:ln w="19050">
+            <a:prstDash val="dash"/>
+          </a:ln>
+        </p:spPr>
+        <p:style>
+          <a:lnRef idx="1">
+            <a:schemeClr val="accent1"/>
+          </a:lnRef>
+          <a:fillRef idx="0">
+            <a:schemeClr val="accent1"/>
+          </a:fillRef>
+          <a:effectRef idx="0">
+            <a:schemeClr val="accent1"/>
+          </a:effectRef>
+          <a:fontRef idx="minor">
+            <a:schemeClr val="tx1"/>
+          </a:fontRef>
+        </p:style>
+        <p:txBody>
+          <a:bodyPr rtlCol="0" anchor="ctr"/>
+          <a:lstStyle/>
+          <a:p>
+            <a:pPr algn="ctr"/>
+            <a:endParaRPr kumimoji="1" lang="zh-CN" altLang="en-US"/>
+          </a:p>
+        </p:txBody>
+      </p:sp>
+      <p:sp>
+        <p:nvSpPr>
+          <p:cNvPr id="13" name="椭圆 12">
+            <a:extLst>
+              <a:ext uri="{FF2B5EF4-FFF2-40B4-BE49-F238E27FC236}">
+                <a16:creationId xmlns:a16="http://schemas.microsoft.com/office/drawing/2014/main" id="{4F325BC2-CC35-FE4E-9929-AE38B7206124}"/>
+              </a:ext>
+            </a:extLst>
+          </p:cNvPr>
+          <p:cNvSpPr/>
+          <p:nvPr/>
+        </p:nvSpPr>
+        <p:spPr>
+          <a:xfrm>
+            <a:off x="5179913" y="2057767"/>
+            <a:ext cx="2952436" cy="962035"/>
+          </a:xfrm>
+          <a:prstGeom prst="ellipse">
+            <a:avLst/>
+          </a:prstGeom>
+        </p:spPr>
+        <p:style>
+          <a:lnRef idx="2">
+            <a:schemeClr val="accent1">
+              <a:shade val="50000"/>
+            </a:schemeClr>
+          </a:lnRef>
+          <a:fillRef idx="1">
+            <a:schemeClr val="accent1"/>
+          </a:fillRef>
+          <a:effectRef idx="0">
+            <a:schemeClr val="accent1"/>
+          </a:effectRef>
+          <a:fontRef idx="minor">
+            <a:schemeClr val="lt1"/>
+          </a:fontRef>
+        </p:style>
+        <p:txBody>
+          <a:bodyPr rtlCol="0" anchor="ctr"/>
+          <a:lstStyle/>
+          <a:p>
+            <a:pPr algn="ctr"/>
+            <a:r>
+              <a:rPr kumimoji="1" lang="zh-CN" altLang="en-US" dirty="0"/>
+              <a:t>控制台</a:t>
+            </a:r>
+            <a:r>
+              <a:rPr kumimoji="1" lang="en-US" altLang="zh-CN" dirty="0"/>
+              <a:t>Context</a:t>
+            </a:r>
+            <a:r>
+              <a:rPr kumimoji="1" lang="zh-CN" altLang="en-US" dirty="0"/>
+              <a:t>上下文</a:t>
+            </a:r>
+          </a:p>
+        </p:txBody>
+      </p:sp>
+      <p:sp>
+        <p:nvSpPr>
+          <p:cNvPr id="14" name="文本框 13">
+            <a:extLst>
+              <a:ext uri="{FF2B5EF4-FFF2-40B4-BE49-F238E27FC236}">
+                <a16:creationId xmlns:a16="http://schemas.microsoft.com/office/drawing/2014/main" id="{8AE3D3A9-9A71-BF44-AA0A-3F0AFA163EDF}"/>
+              </a:ext>
+            </a:extLst>
+          </p:cNvPr>
+          <p:cNvSpPr txBox="1"/>
+          <p:nvPr/>
+        </p:nvSpPr>
+        <p:spPr>
+          <a:xfrm>
+            <a:off x="5708769" y="1586917"/>
+            <a:ext cx="1877437" cy="369332"/>
+          </a:xfrm>
+          <a:prstGeom prst="rect">
+            <a:avLst/>
+          </a:prstGeom>
+          <a:noFill/>
+        </p:spPr>
+        <p:txBody>
+          <a:bodyPr wrap="none" rtlCol="0">
+            <a:spAutoFit/>
+          </a:bodyPr>
+          <a:lstStyle/>
+          <a:p>
+            <a:r>
+              <a:rPr kumimoji="1" lang="en-US" altLang="zh-CN" dirty="0"/>
+              <a:t>Context</a:t>
+            </a:r>
+            <a:r>
+              <a:rPr kumimoji="1" lang="zh-CN" altLang="en-US" dirty="0"/>
+              <a:t>支撑子域</a:t>
+            </a:r>
+            <a:endParaRPr kumimoji="1" lang="en-US" altLang="zh-CN" dirty="0"/>
           </a:p>
         </p:txBody>
       </p:sp>
@@ -3681,10 +3841,45 @@
       </p:grpSpPr>
       <p:sp>
         <p:nvSpPr>
-          <p:cNvPr id="11" name="椭圆 10">
-            <a:extLst>
-              <a:ext uri="{FF2B5EF4-FFF2-40B4-BE49-F238E27FC236}">
-                <a16:creationId xmlns:a16="http://schemas.microsoft.com/office/drawing/2014/main" id="{52EF33C0-DB3C-AF48-BFC9-C2B3C1356364}"/>
+          <p:cNvPr id="17" name="文本框 16">
+            <a:extLst>
+              <a:ext uri="{FF2B5EF4-FFF2-40B4-BE49-F238E27FC236}">
+                <a16:creationId xmlns:a16="http://schemas.microsoft.com/office/drawing/2014/main" id="{7D25DA9E-53C9-1648-8D83-6E43D44A5202}"/>
+              </a:ext>
+            </a:extLst>
+          </p:cNvPr>
+          <p:cNvSpPr txBox="1"/>
+          <p:nvPr/>
+        </p:nvSpPr>
+        <p:spPr>
+          <a:xfrm>
+            <a:off x="0" y="0"/>
+            <a:ext cx="1569660" cy="369332"/>
+          </a:xfrm>
+          <a:prstGeom prst="rect">
+            <a:avLst/>
+          </a:prstGeom>
+          <a:noFill/>
+        </p:spPr>
+        <p:txBody>
+          <a:bodyPr wrap="none" rtlCol="0">
+            <a:spAutoFit/>
+          </a:bodyPr>
+          <a:lstStyle/>
+          <a:p>
+            <a:r>
+              <a:rPr kumimoji="1" lang="zh-CN" altLang="en-US" dirty="0"/>
+              <a:t>上下文映射图</a:t>
+            </a:r>
+          </a:p>
+        </p:txBody>
+      </p:sp>
+      <p:sp>
+        <p:nvSpPr>
+          <p:cNvPr id="32" name="椭圆 31">
+            <a:extLst>
+              <a:ext uri="{FF2B5EF4-FFF2-40B4-BE49-F238E27FC236}">
+                <a16:creationId xmlns:a16="http://schemas.microsoft.com/office/drawing/2014/main" id="{A00E7EF4-4ADC-974A-9485-1385DC711823}"/>
               </a:ext>
             </a:extLst>
           </p:cNvPr>
@@ -3723,54 +3918,12 @@
           </a:p>
         </p:txBody>
       </p:sp>
-      <p:cxnSp>
-        <p:nvCxnSpPr>
-          <p:cNvPr id="12" name="直线连接符 11">
-            <a:extLst>
-              <a:ext uri="{FF2B5EF4-FFF2-40B4-BE49-F238E27FC236}">
-                <a16:creationId xmlns:a16="http://schemas.microsoft.com/office/drawing/2014/main" id="{E4EE4498-7D9C-B446-A65A-A8A9EC3A3909}"/>
-              </a:ext>
-            </a:extLst>
-          </p:cNvPr>
-          <p:cNvCxnSpPr>
-            <a:stCxn id="11" idx="7"/>
-            <a:endCxn id="11" idx="3"/>
-          </p:cNvCxnSpPr>
-          <p:nvPr/>
-        </p:nvCxnSpPr>
-        <p:spPr>
-          <a:xfrm flipH="1">
-            <a:off x="4208863" y="2070122"/>
-            <a:ext cx="4184180" cy="2801840"/>
-          </a:xfrm>
-          <a:prstGeom prst="line">
-            <a:avLst/>
-          </a:prstGeom>
-          <a:ln>
-            <a:prstDash val="dash"/>
-          </a:ln>
-        </p:spPr>
-        <p:style>
-          <a:lnRef idx="1">
-            <a:schemeClr val="accent1"/>
-          </a:lnRef>
-          <a:fillRef idx="0">
-            <a:schemeClr val="accent1"/>
-          </a:fillRef>
-          <a:effectRef idx="0">
-            <a:schemeClr val="accent1"/>
-          </a:effectRef>
-          <a:fontRef idx="minor">
-            <a:schemeClr val="tx1"/>
-          </a:fontRef>
-        </p:style>
-      </p:cxnSp>
-      <p:sp>
-        <p:nvSpPr>
-          <p:cNvPr id="13" name="文本框 12">
-            <a:extLst>
-              <a:ext uri="{FF2B5EF4-FFF2-40B4-BE49-F238E27FC236}">
-                <a16:creationId xmlns:a16="http://schemas.microsoft.com/office/drawing/2014/main" id="{06448A95-251C-5B41-B862-7DC6EAD1011C}"/>
+      <p:sp>
+        <p:nvSpPr>
+          <p:cNvPr id="33" name="文本框 32">
+            <a:extLst>
+              <a:ext uri="{FF2B5EF4-FFF2-40B4-BE49-F238E27FC236}">
+                <a16:creationId xmlns:a16="http://schemas.microsoft.com/office/drawing/2014/main" id="{D3636DA6-7331-D64B-99B3-EC9C88D880C5}"/>
               </a:ext>
             </a:extLst>
           </p:cNvPr>
@@ -3779,7 +3932,7 @@
         </p:nvSpPr>
         <p:spPr>
           <a:xfrm>
-            <a:off x="5423338" y="1595316"/>
+            <a:off x="4023260" y="2082546"/>
             <a:ext cx="1107996" cy="369332"/>
           </a:xfrm>
           <a:prstGeom prst="rect">
@@ -3803,10 +3956,10 @@
       </p:sp>
       <p:sp>
         <p:nvSpPr>
-          <p:cNvPr id="14" name="文本框 13">
-            <a:extLst>
-              <a:ext uri="{FF2B5EF4-FFF2-40B4-BE49-F238E27FC236}">
-                <a16:creationId xmlns:a16="http://schemas.microsoft.com/office/drawing/2014/main" id="{FFAF2089-536D-004B-9F47-AC84A6EFBAA3}"/>
+          <p:cNvPr id="34" name="文本框 33">
+            <a:extLst>
+              <a:ext uri="{FF2B5EF4-FFF2-40B4-BE49-F238E27FC236}">
+                <a16:creationId xmlns:a16="http://schemas.microsoft.com/office/drawing/2014/main" id="{4193EE50-1B51-054B-BEEC-7A377531B30C}"/>
               </a:ext>
             </a:extLst>
           </p:cNvPr>
@@ -3815,7 +3968,7 @@
         </p:nvSpPr>
         <p:spPr>
           <a:xfrm>
-            <a:off x="7839045" y="2588544"/>
+            <a:off x="8082441" y="2793358"/>
             <a:ext cx="1107996" cy="369332"/>
           </a:xfrm>
           <a:prstGeom prst="rect">
@@ -3839,10 +3992,10 @@
       </p:sp>
       <p:sp>
         <p:nvSpPr>
-          <p:cNvPr id="15" name="椭圆 14">
-            <a:extLst>
-              <a:ext uri="{FF2B5EF4-FFF2-40B4-BE49-F238E27FC236}">
-                <a16:creationId xmlns:a16="http://schemas.microsoft.com/office/drawing/2014/main" id="{D55752E1-506B-684C-BBFF-E259B46A15BF}"/>
+          <p:cNvPr id="35" name="椭圆 34">
+            <a:extLst>
+              <a:ext uri="{FF2B5EF4-FFF2-40B4-BE49-F238E27FC236}">
+                <a16:creationId xmlns:a16="http://schemas.microsoft.com/office/drawing/2014/main" id="{FB5478A5-92D1-6A4B-A7FD-D1413FA50946}"/>
               </a:ext>
             </a:extLst>
           </p:cNvPr>
@@ -3851,8 +4004,8 @@
         </p:nvSpPr>
         <p:spPr>
           <a:xfrm>
-            <a:off x="3731173" y="2169600"/>
-            <a:ext cx="2364828" cy="1259400"/>
+            <a:off x="3569597" y="3044581"/>
+            <a:ext cx="2015322" cy="1083210"/>
           </a:xfrm>
           <a:prstGeom prst="ellipse">
             <a:avLst/>
@@ -3888,10 +4041,10 @@
       </p:sp>
       <p:sp>
         <p:nvSpPr>
-          <p:cNvPr id="16" name="椭圆 15">
-            <a:extLst>
-              <a:ext uri="{FF2B5EF4-FFF2-40B4-BE49-F238E27FC236}">
-                <a16:creationId xmlns:a16="http://schemas.microsoft.com/office/drawing/2014/main" id="{29C7A7F4-20C7-F943-8AAC-3720F71D8676}"/>
+          <p:cNvPr id="36" name="椭圆 35">
+            <a:extLst>
+              <a:ext uri="{FF2B5EF4-FFF2-40B4-BE49-F238E27FC236}">
+                <a16:creationId xmlns:a16="http://schemas.microsoft.com/office/drawing/2014/main" id="{897B81F5-9136-E14F-86E6-65FDFFC026F8}"/>
               </a:ext>
             </a:extLst>
           </p:cNvPr>
@@ -3900,8 +4053,8 @@
         </p:nvSpPr>
         <p:spPr>
           <a:xfrm>
-            <a:off x="6096000" y="3815254"/>
-            <a:ext cx="2348226" cy="1346847"/>
+            <a:off x="6262767" y="3671838"/>
+            <a:ext cx="2099998" cy="1328029"/>
           </a:xfrm>
           <a:prstGeom prst="ellipse">
             <a:avLst/>
@@ -3937,10 +4090,10 @@
       </p:sp>
       <p:sp>
         <p:nvSpPr>
-          <p:cNvPr id="17" name="文本框 16">
-            <a:extLst>
-              <a:ext uri="{FF2B5EF4-FFF2-40B4-BE49-F238E27FC236}">
-                <a16:creationId xmlns:a16="http://schemas.microsoft.com/office/drawing/2014/main" id="{7D25DA9E-53C9-1648-8D83-6E43D44A5202}"/>
+          <p:cNvPr id="38" name="文本框 37">
+            <a:extLst>
+              <a:ext uri="{FF2B5EF4-FFF2-40B4-BE49-F238E27FC236}">
+                <a16:creationId xmlns:a16="http://schemas.microsoft.com/office/drawing/2014/main" id="{BA3BC912-1D31-F140-806B-C24406C961CB}"/>
               </a:ext>
             </a:extLst>
           </p:cNvPr>
@@ -3949,8 +4102,8 @@
         </p:nvSpPr>
         <p:spPr>
           <a:xfrm>
-            <a:off x="0" y="0"/>
-            <a:ext cx="1569660" cy="369332"/>
+            <a:off x="7178566" y="1135117"/>
+            <a:ext cx="646331" cy="369332"/>
           </a:xfrm>
           <a:prstGeom prst="rect">
             <a:avLst/>
@@ -3965,31 +4118,226 @@
           <a:p>
             <a:r>
               <a:rPr kumimoji="1" lang="zh-CN" altLang="en-US" dirty="0"/>
-              <a:t>上下文映射图</a:t>
-            </a:r>
+              <a:t>领域</a:t>
+            </a:r>
+          </a:p>
+        </p:txBody>
+      </p:sp>
+      <p:sp>
+        <p:nvSpPr>
+          <p:cNvPr id="39" name="弧 38">
+            <a:extLst>
+              <a:ext uri="{FF2B5EF4-FFF2-40B4-BE49-F238E27FC236}">
+                <a16:creationId xmlns:a16="http://schemas.microsoft.com/office/drawing/2014/main" id="{FEA7A6E6-9EB2-F54A-845A-6C5C7FF022AD}"/>
+              </a:ext>
+            </a:extLst>
+          </p:cNvPr>
+          <p:cNvSpPr/>
+          <p:nvPr/>
+        </p:nvSpPr>
+        <p:spPr>
+          <a:xfrm rot="19873039">
+            <a:off x="5123942" y="2872794"/>
+            <a:ext cx="4962697" cy="3042727"/>
+          </a:xfrm>
+          <a:prstGeom prst="arc">
+            <a:avLst>
+              <a:gd name="adj1" fmla="val 11171812"/>
+              <a:gd name="adj2" fmla="val 20273594"/>
+            </a:avLst>
+          </a:prstGeom>
+          <a:ln w="19050">
+            <a:prstDash val="dash"/>
+          </a:ln>
+        </p:spPr>
+        <p:style>
+          <a:lnRef idx="1">
+            <a:schemeClr val="accent1"/>
+          </a:lnRef>
+          <a:fillRef idx="0">
+            <a:schemeClr val="accent1"/>
+          </a:fillRef>
+          <a:effectRef idx="0">
+            <a:schemeClr val="accent1"/>
+          </a:effectRef>
+          <a:fontRef idx="minor">
+            <a:schemeClr val="tx1"/>
+          </a:fontRef>
+        </p:style>
+        <p:txBody>
+          <a:bodyPr rtlCol="0" anchor="ctr"/>
+          <a:lstStyle/>
+          <a:p>
+            <a:pPr algn="ctr"/>
+            <a:endParaRPr kumimoji="1" lang="zh-CN" altLang="en-US"/>
+          </a:p>
+        </p:txBody>
+      </p:sp>
+      <p:sp>
+        <p:nvSpPr>
+          <p:cNvPr id="40" name="弧 39">
+            <a:extLst>
+              <a:ext uri="{FF2B5EF4-FFF2-40B4-BE49-F238E27FC236}">
+                <a16:creationId xmlns:a16="http://schemas.microsoft.com/office/drawing/2014/main" id="{17FAEA02-413D-D641-B87A-2DF0990BB9B1}"/>
+              </a:ext>
+            </a:extLst>
+          </p:cNvPr>
+          <p:cNvSpPr/>
+          <p:nvPr/>
+        </p:nvSpPr>
+        <p:spPr>
+          <a:xfrm rot="13475816" flipV="1">
+            <a:off x="3425169" y="2042803"/>
+            <a:ext cx="2980583" cy="2428989"/>
+          </a:xfrm>
+          <a:prstGeom prst="arc">
+            <a:avLst>
+              <a:gd name="adj1" fmla="val 13097593"/>
+              <a:gd name="adj2" fmla="val 20101184"/>
+            </a:avLst>
+          </a:prstGeom>
+          <a:ln w="19050">
+            <a:prstDash val="dash"/>
+          </a:ln>
+        </p:spPr>
+        <p:style>
+          <a:lnRef idx="1">
+            <a:schemeClr val="accent1"/>
+          </a:lnRef>
+          <a:fillRef idx="0">
+            <a:schemeClr val="accent1"/>
+          </a:fillRef>
+          <a:effectRef idx="0">
+            <a:schemeClr val="accent1"/>
+          </a:effectRef>
+          <a:fontRef idx="minor">
+            <a:schemeClr val="tx1"/>
+          </a:fontRef>
+        </p:style>
+        <p:txBody>
+          <a:bodyPr rtlCol="0" anchor="ctr"/>
+          <a:lstStyle/>
+          <a:p>
+            <a:pPr algn="ctr"/>
+            <a:endParaRPr kumimoji="1" lang="zh-CN" altLang="en-US"/>
+          </a:p>
+        </p:txBody>
+      </p:sp>
+      <p:sp>
+        <p:nvSpPr>
+          <p:cNvPr id="41" name="椭圆 40">
+            <a:extLst>
+              <a:ext uri="{FF2B5EF4-FFF2-40B4-BE49-F238E27FC236}">
+                <a16:creationId xmlns:a16="http://schemas.microsoft.com/office/drawing/2014/main" id="{145486A0-221C-4B48-95E1-43F0217D775C}"/>
+              </a:ext>
+            </a:extLst>
+          </p:cNvPr>
+          <p:cNvSpPr/>
+          <p:nvPr/>
+        </p:nvSpPr>
+        <p:spPr>
+          <a:xfrm>
+            <a:off x="5179913" y="2057767"/>
+            <a:ext cx="2952436" cy="962035"/>
+          </a:xfrm>
+          <a:prstGeom prst="ellipse">
+            <a:avLst/>
+          </a:prstGeom>
+        </p:spPr>
+        <p:style>
+          <a:lnRef idx="2">
+            <a:schemeClr val="accent1">
+              <a:shade val="50000"/>
+            </a:schemeClr>
+          </a:lnRef>
+          <a:fillRef idx="1">
+            <a:schemeClr val="accent1"/>
+          </a:fillRef>
+          <a:effectRef idx="0">
+            <a:schemeClr val="accent1"/>
+          </a:effectRef>
+          <a:fontRef idx="minor">
+            <a:schemeClr val="lt1"/>
+          </a:fontRef>
+        </p:style>
+        <p:txBody>
+          <a:bodyPr rtlCol="0" anchor="ctr"/>
+          <a:lstStyle/>
+          <a:p>
+            <a:pPr algn="ctr"/>
+            <a:r>
+              <a:rPr kumimoji="1" lang="zh-CN" altLang="en-US" dirty="0"/>
+              <a:t>控制台</a:t>
+            </a:r>
+            <a:r>
+              <a:rPr kumimoji="1" lang="en-US" altLang="zh-CN" dirty="0"/>
+              <a:t>Context</a:t>
+            </a:r>
+            <a:r>
+              <a:rPr kumimoji="1" lang="zh-CN" altLang="en-US" dirty="0"/>
+              <a:t>上下文</a:t>
+            </a:r>
+          </a:p>
+        </p:txBody>
+      </p:sp>
+      <p:sp>
+        <p:nvSpPr>
+          <p:cNvPr id="42" name="文本框 41">
+            <a:extLst>
+              <a:ext uri="{FF2B5EF4-FFF2-40B4-BE49-F238E27FC236}">
+                <a16:creationId xmlns:a16="http://schemas.microsoft.com/office/drawing/2014/main" id="{33CD0251-584A-8642-9439-30AECD1C5CBB}"/>
+              </a:ext>
+            </a:extLst>
+          </p:cNvPr>
+          <p:cNvSpPr txBox="1"/>
+          <p:nvPr/>
+        </p:nvSpPr>
+        <p:spPr>
+          <a:xfrm>
+            <a:off x="5708769" y="1586917"/>
+            <a:ext cx="1877437" cy="369332"/>
+          </a:xfrm>
+          <a:prstGeom prst="rect">
+            <a:avLst/>
+          </a:prstGeom>
+          <a:noFill/>
+        </p:spPr>
+        <p:txBody>
+          <a:bodyPr wrap="none" rtlCol="0">
+            <a:spAutoFit/>
+          </a:bodyPr>
+          <a:lstStyle/>
+          <a:p>
+            <a:r>
+              <a:rPr kumimoji="1" lang="en-US" altLang="zh-CN" dirty="0"/>
+              <a:t>Context</a:t>
+            </a:r>
+            <a:r>
+              <a:rPr kumimoji="1" lang="zh-CN" altLang="en-US" dirty="0"/>
+              <a:t>支撑子域</a:t>
+            </a:r>
+            <a:endParaRPr kumimoji="1" lang="en-US" altLang="zh-CN" dirty="0"/>
           </a:p>
         </p:txBody>
       </p:sp>
       <p:cxnSp>
         <p:nvCxnSpPr>
-          <p:cNvPr id="19" name="直线连接符 18">
-            <a:extLst>
-              <a:ext uri="{FF2B5EF4-FFF2-40B4-BE49-F238E27FC236}">
-                <a16:creationId xmlns:a16="http://schemas.microsoft.com/office/drawing/2014/main" id="{4EE6FA0B-66FB-FE4C-AB8C-E7ECF420F29F}"/>
+          <p:cNvPr id="3" name="直线连接符 2">
+            <a:extLst>
+              <a:ext uri="{FF2B5EF4-FFF2-40B4-BE49-F238E27FC236}">
+                <a16:creationId xmlns:a16="http://schemas.microsoft.com/office/drawing/2014/main" id="{FD56D92F-C42E-C043-9377-A5F473E10B81}"/>
               </a:ext>
             </a:extLst>
           </p:cNvPr>
           <p:cNvCxnSpPr>
-            <a:cxnSpLocks/>
-            <a:stCxn id="15" idx="5"/>
-            <a:endCxn id="16" idx="1"/>
+            <a:endCxn id="36" idx="1"/>
           </p:cNvCxnSpPr>
           <p:nvPr/>
         </p:nvCxnSpPr>
         <p:spPr>
           <a:xfrm>
-            <a:off x="5749680" y="3244565"/>
-            <a:ext cx="690210" cy="767930"/>
+            <a:off x="5584919" y="3573379"/>
+            <a:ext cx="985386" cy="292944"/>
           </a:xfrm>
           <a:prstGeom prst="line">
             <a:avLst/>
@@ -4010,12 +4358,89 @@
           </a:fontRef>
         </p:style>
       </p:cxnSp>
-      <p:sp>
-        <p:nvSpPr>
-          <p:cNvPr id="22" name="文本框 21">
-            <a:extLst>
-              <a:ext uri="{FF2B5EF4-FFF2-40B4-BE49-F238E27FC236}">
-                <a16:creationId xmlns:a16="http://schemas.microsoft.com/office/drawing/2014/main" id="{451F59E4-217B-EE4D-9BEF-80867994514B}"/>
+      <p:cxnSp>
+        <p:nvCxnSpPr>
+          <p:cNvPr id="5" name="直线连接符 4">
+            <a:extLst>
+              <a:ext uri="{FF2B5EF4-FFF2-40B4-BE49-F238E27FC236}">
+                <a16:creationId xmlns:a16="http://schemas.microsoft.com/office/drawing/2014/main" id="{2FC9EB08-BC98-494B-9B14-1C031111991D}"/>
+              </a:ext>
+            </a:extLst>
+          </p:cNvPr>
+          <p:cNvCxnSpPr>
+            <a:stCxn id="41" idx="3"/>
+            <a:endCxn id="35" idx="7"/>
+          </p:cNvCxnSpPr>
+          <p:nvPr/>
+        </p:nvCxnSpPr>
+        <p:spPr>
+          <a:xfrm flipH="1">
+            <a:off x="5289782" y="2878915"/>
+            <a:ext cx="322505" cy="324298"/>
+          </a:xfrm>
+          <a:prstGeom prst="line">
+            <a:avLst/>
+          </a:prstGeom>
+        </p:spPr>
+        <p:style>
+          <a:lnRef idx="1">
+            <a:schemeClr val="accent1"/>
+          </a:lnRef>
+          <a:fillRef idx="0">
+            <a:schemeClr val="accent1"/>
+          </a:fillRef>
+          <a:effectRef idx="0">
+            <a:schemeClr val="accent1"/>
+          </a:effectRef>
+          <a:fontRef idx="minor">
+            <a:schemeClr val="tx1"/>
+          </a:fontRef>
+        </p:style>
+      </p:cxnSp>
+      <p:cxnSp>
+        <p:nvCxnSpPr>
+          <p:cNvPr id="7" name="直线连接符 6">
+            <a:extLst>
+              <a:ext uri="{FF2B5EF4-FFF2-40B4-BE49-F238E27FC236}">
+                <a16:creationId xmlns:a16="http://schemas.microsoft.com/office/drawing/2014/main" id="{0DEE74FF-A672-2F43-B50B-264D107346E9}"/>
+              </a:ext>
+            </a:extLst>
+          </p:cNvPr>
+          <p:cNvCxnSpPr>
+            <a:endCxn id="36" idx="0"/>
+          </p:cNvCxnSpPr>
+          <p:nvPr/>
+        </p:nvCxnSpPr>
+        <p:spPr>
+          <a:xfrm>
+            <a:off x="6607083" y="3019802"/>
+            <a:ext cx="705683" cy="652036"/>
+          </a:xfrm>
+          <a:prstGeom prst="line">
+            <a:avLst/>
+          </a:prstGeom>
+        </p:spPr>
+        <p:style>
+          <a:lnRef idx="1">
+            <a:schemeClr val="accent1"/>
+          </a:lnRef>
+          <a:fillRef idx="0">
+            <a:schemeClr val="accent1"/>
+          </a:fillRef>
+          <a:effectRef idx="0">
+            <a:schemeClr val="accent1"/>
+          </a:effectRef>
+          <a:fontRef idx="minor">
+            <a:schemeClr val="tx1"/>
+          </a:fontRef>
+        </p:style>
+      </p:cxnSp>
+      <p:sp>
+        <p:nvSpPr>
+          <p:cNvPr id="8" name="文本框 7">
+            <a:extLst>
+              <a:ext uri="{FF2B5EF4-FFF2-40B4-BE49-F238E27FC236}">
+                <a16:creationId xmlns:a16="http://schemas.microsoft.com/office/drawing/2014/main" id="{D6EED554-A885-354F-AAAA-63274304ED6D}"/>
               </a:ext>
             </a:extLst>
           </p:cNvPr>
@@ -4024,7 +4449,7 @@
         </p:nvSpPr>
         <p:spPr>
           <a:xfrm>
-            <a:off x="5865169" y="3068129"/>
+            <a:off x="5473671" y="3644838"/>
             <a:ext cx="338554" cy="369332"/>
           </a:xfrm>
           <a:prstGeom prst="rect">
@@ -4048,10 +4473,10 @@
       </p:sp>
       <p:sp>
         <p:nvSpPr>
-          <p:cNvPr id="23" name="文本框 22">
-            <a:extLst>
-              <a:ext uri="{FF2B5EF4-FFF2-40B4-BE49-F238E27FC236}">
-                <a16:creationId xmlns:a16="http://schemas.microsoft.com/office/drawing/2014/main" id="{22FF2633-BC31-0443-A1EF-0446028D5090}"/>
+          <p:cNvPr id="43" name="文本框 42">
+            <a:extLst>
+              <a:ext uri="{FF2B5EF4-FFF2-40B4-BE49-F238E27FC236}">
+                <a16:creationId xmlns:a16="http://schemas.microsoft.com/office/drawing/2014/main" id="{F7625565-12FC-DA4F-9A01-CD3218E525B8}"/>
               </a:ext>
             </a:extLst>
           </p:cNvPr>
@@ -4060,8 +4485,8 @@
         </p:nvSpPr>
         <p:spPr>
           <a:xfrm>
-            <a:off x="6328244" y="3589300"/>
-            <a:ext cx="343364" cy="369332"/>
+            <a:off x="5643778" y="2893675"/>
+            <a:ext cx="338554" cy="369332"/>
           </a:xfrm>
           <a:prstGeom prst="rect">
             <a:avLst/>
@@ -4076,7 +4501,7 @@
           <a:p>
             <a:r>
               <a:rPr kumimoji="1" lang="en-US" altLang="zh-CN" dirty="0"/>
-              <a:t>D</a:t>
+              <a:t>U</a:t>
             </a:r>
             <a:endParaRPr kumimoji="1" lang="zh-CN" altLang="en-US" dirty="0"/>
           </a:p>
@@ -4084,10 +4509,10 @@
       </p:sp>
       <p:sp>
         <p:nvSpPr>
-          <p:cNvPr id="24" name="文本框 23">
-            <a:extLst>
-              <a:ext uri="{FF2B5EF4-FFF2-40B4-BE49-F238E27FC236}">
-                <a16:creationId xmlns:a16="http://schemas.microsoft.com/office/drawing/2014/main" id="{987FA829-9924-EA41-A08E-215B4B398998}"/>
+          <p:cNvPr id="44" name="文本框 43">
+            <a:extLst>
+              <a:ext uri="{FF2B5EF4-FFF2-40B4-BE49-F238E27FC236}">
+                <a16:creationId xmlns:a16="http://schemas.microsoft.com/office/drawing/2014/main" id="{DCFD56D9-F7CE-FE45-8D1E-FC1901FA2DD3}"/>
               </a:ext>
             </a:extLst>
           </p:cNvPr>
@@ -4096,8 +4521,8 @@
         </p:nvSpPr>
         <p:spPr>
           <a:xfrm>
-            <a:off x="5189681" y="3489401"/>
-            <a:ext cx="902811" cy="369332"/>
+            <a:off x="6829358" y="3002706"/>
+            <a:ext cx="338554" cy="369332"/>
           </a:xfrm>
           <a:prstGeom prst="rect">
             <a:avLst/>
@@ -4112,7 +4537,7 @@
           <a:p>
             <a:r>
               <a:rPr kumimoji="1" lang="en-US" altLang="zh-CN" dirty="0"/>
-              <a:t>Partner</a:t>
+              <a:t>U</a:t>
             </a:r>
             <a:endParaRPr kumimoji="1" lang="zh-CN" altLang="en-US" dirty="0"/>
           </a:p>
@@ -4120,10 +4545,10 @@
       </p:sp>
       <p:sp>
         <p:nvSpPr>
-          <p:cNvPr id="25" name="文本框 24">
-            <a:extLst>
-              <a:ext uri="{FF2B5EF4-FFF2-40B4-BE49-F238E27FC236}">
-                <a16:creationId xmlns:a16="http://schemas.microsoft.com/office/drawing/2014/main" id="{C15AF1DF-6C3A-EF49-91A7-A12E2364B59E}"/>
+          <p:cNvPr id="45" name="文本框 44">
+            <a:extLst>
+              <a:ext uri="{FF2B5EF4-FFF2-40B4-BE49-F238E27FC236}">
+                <a16:creationId xmlns:a16="http://schemas.microsoft.com/office/drawing/2014/main" id="{03D6CCB0-CF2A-144C-83B0-0289528AE273}"/>
               </a:ext>
             </a:extLst>
           </p:cNvPr>
@@ -4132,8 +4557,8 @@
         </p:nvSpPr>
         <p:spPr>
           <a:xfrm>
-            <a:off x="7178566" y="1135117"/>
-            <a:ext cx="646331" cy="369332"/>
+            <a:off x="6095350" y="3780116"/>
+            <a:ext cx="343364" cy="369332"/>
           </a:xfrm>
           <a:prstGeom prst="rect">
             <a:avLst/>
@@ -4147,9 +4572,82 @@
           <a:lstStyle/>
           <a:p>
             <a:r>
-              <a:rPr kumimoji="1" lang="zh-CN" altLang="en-US" dirty="0"/>
-              <a:t>领域</a:t>
-            </a:r>
+              <a:rPr kumimoji="1" lang="en-US" altLang="zh-CN" dirty="0"/>
+              <a:t>D</a:t>
+            </a:r>
+            <a:endParaRPr kumimoji="1" lang="zh-CN" altLang="en-US" dirty="0"/>
+          </a:p>
+        </p:txBody>
+      </p:sp>
+      <p:sp>
+        <p:nvSpPr>
+          <p:cNvPr id="46" name="文本框 45">
+            <a:extLst>
+              <a:ext uri="{FF2B5EF4-FFF2-40B4-BE49-F238E27FC236}">
+                <a16:creationId xmlns:a16="http://schemas.microsoft.com/office/drawing/2014/main" id="{2F0A11B4-1264-B74D-B63B-1FA583A5E310}"/>
+              </a:ext>
+            </a:extLst>
+          </p:cNvPr>
+          <p:cNvSpPr txBox="1"/>
+          <p:nvPr/>
+        </p:nvSpPr>
+        <p:spPr>
+          <a:xfrm>
+            <a:off x="7246145" y="3331369"/>
+            <a:ext cx="343364" cy="369332"/>
+          </a:xfrm>
+          <a:prstGeom prst="rect">
+            <a:avLst/>
+          </a:prstGeom>
+          <a:noFill/>
+        </p:spPr>
+        <p:txBody>
+          <a:bodyPr wrap="none" rtlCol="0">
+            <a:spAutoFit/>
+          </a:bodyPr>
+          <a:lstStyle/>
+          <a:p>
+            <a:r>
+              <a:rPr kumimoji="1" lang="en-US" altLang="zh-CN" dirty="0"/>
+              <a:t>D</a:t>
+            </a:r>
+            <a:endParaRPr kumimoji="1" lang="zh-CN" altLang="en-US" dirty="0"/>
+          </a:p>
+        </p:txBody>
+      </p:sp>
+      <p:sp>
+        <p:nvSpPr>
+          <p:cNvPr id="47" name="文本框 46">
+            <a:extLst>
+              <a:ext uri="{FF2B5EF4-FFF2-40B4-BE49-F238E27FC236}">
+                <a16:creationId xmlns:a16="http://schemas.microsoft.com/office/drawing/2014/main" id="{2E56F765-1095-4645-887A-58B9D035FBB6}"/>
+              </a:ext>
+            </a:extLst>
+          </p:cNvPr>
+          <p:cNvSpPr txBox="1"/>
+          <p:nvPr/>
+        </p:nvSpPr>
+        <p:spPr>
+          <a:xfrm>
+            <a:off x="5372282" y="3041064"/>
+            <a:ext cx="343364" cy="369332"/>
+          </a:xfrm>
+          <a:prstGeom prst="rect">
+            <a:avLst/>
+          </a:prstGeom>
+          <a:noFill/>
+        </p:spPr>
+        <p:txBody>
+          <a:bodyPr wrap="none" rtlCol="0">
+            <a:spAutoFit/>
+          </a:bodyPr>
+          <a:lstStyle/>
+          <a:p>
+            <a:r>
+              <a:rPr kumimoji="1" lang="en-US" altLang="zh-CN" dirty="0"/>
+              <a:t>D</a:t>
+            </a:r>
+            <a:endParaRPr kumimoji="1" lang="zh-CN" altLang="en-US" dirty="0"/>
           </a:p>
         </p:txBody>
       </p:sp>

</xml_diff>